<commit_message>
This branch was created to Build the Office DEVCamp in Los Angeles. Additions: Word Docs were created with updated screenshots, dialogs, and the csproj files were updated for VS2013. Also, the Presentations were updated and there will be podcats added for modules 02 through 05. The treason we are not updating the Anfroid App is we are waiying for the next SDK to have Android built into VS2013 and VS2015
</commit_message>
<xml_diff>
--- a/01.Introduction to the Day/Introduction to the Day.pptx
+++ b/01.Introduction to the Day/Introduction to the Day.pptx
@@ -402,7 +402,7 @@
           <a:p>
             <a:fld id="{DE219B1A-AE41-483B-A766-69B9363DDA6A}" type="datetimeFigureOut">
               <a:rPr lang="en-US" smtClean="0"/>
-              <a:t>10/27/2014</a:t>
+              <a:t>6/7/2015</a:t>
             </a:fld>
             <a:endParaRPr lang="en-US"/>
           </a:p>
@@ -684,7 +684,7 @@
           <a:p>
             <a:fld id="{D51B1278-D92B-4AF3-A9C1-71DD298190CE}" type="datetimeFigureOut">
               <a:rPr lang="en-US" smtClean="0"/>
-              <a:t>10/27/2014</a:t>
+              <a:t>6/7/2015</a:t>
             </a:fld>
             <a:endParaRPr lang="en-US"/>
           </a:p>
@@ -1398,7 +1398,7 @@
                 </a:solidFill>
               </a:rPr>
               <a:pPr/>
-              <a:t>10/27/2014</a:t>
+              <a:t>6/7/2015</a:t>
             </a:fld>
             <a:endParaRPr lang="en-US">
               <a:solidFill>
@@ -1630,7 +1630,7 @@
           <a:p>
             <a:fld id="{D31E4894-7650-4412-ACB8-29465F440D88}" type="datetime1">
               <a:rPr lang="en-US" smtClean="0"/>
-              <a:t>10/27/2014</a:t>
+              <a:t>6/7/2015</a:t>
             </a:fld>
             <a:endParaRPr lang="en-US" dirty="0"/>
           </a:p>
@@ -1866,7 +1866,7 @@
                 </a:solidFill>
               </a:rPr>
               <a:pPr/>
-              <a:t>10/27/2014</a:t>
+              <a:t>6/7/2015</a:t>
             </a:fld>
             <a:endParaRPr lang="en-US">
               <a:solidFill>
@@ -2098,7 +2098,7 @@
           <a:p>
             <a:fld id="{13E92F52-F2C6-4745-BBDE-E5EE0DA70D4E}" type="datetime1">
               <a:rPr lang="en-US" smtClean="0"/>
-              <a:t>10/27/2014</a:t>
+              <a:t>6/7/2015</a:t>
             </a:fld>
             <a:endParaRPr lang="en-US" dirty="0"/>
           </a:p>
@@ -2240,7 +2240,7 @@
           <a:p>
             <a:fld id="{D51B1278-D92B-4AF3-A9C1-71DD298190CE}" type="datetimeFigureOut">
               <a:rPr lang="en-US" smtClean="0"/>
-              <a:t>10/27/2014</a:t>
+              <a:t>6/7/2015</a:t>
             </a:fld>
             <a:endParaRPr lang="en-US"/>
           </a:p>
@@ -2462,7 +2462,7 @@
           <a:p>
             <a:fld id="{D51B1278-D92B-4AF3-A9C1-71DD298190CE}" type="datetimeFigureOut">
               <a:rPr lang="en-US" smtClean="0"/>
-              <a:t>10/27/2014</a:t>
+              <a:t>6/7/2015</a:t>
             </a:fld>
             <a:endParaRPr lang="en-US"/>
           </a:p>
@@ -2699,7 +2699,7 @@
           <a:p>
             <a:fld id="{DBC13BCB-57C4-454F-8C02-26BDCE1A7007}" type="datetime1">
               <a:rPr lang="en-US" smtClean="0"/>
-              <a:t>10/27/2014</a:t>
+              <a:t>6/7/2015</a:t>
             </a:fld>
             <a:endParaRPr lang="en-US"/>
           </a:p>
@@ -2939,7 +2939,7 @@
           <a:p>
             <a:fld id="{4158D9CF-52ED-4C2B-9870-3BEFB23E0EBC}" type="datetime1">
               <a:rPr lang="en-US" smtClean="0"/>
-              <a:t>10/27/2014</a:t>
+              <a:t>6/7/2015</a:t>
             </a:fld>
             <a:endParaRPr lang="en-US" dirty="0"/>
           </a:p>
@@ -3109,7 +3109,7 @@
           <a:p>
             <a:fld id="{D51B1278-D92B-4AF3-A9C1-71DD298190CE}" type="datetimeFigureOut">
               <a:rPr lang="en-US" smtClean="0"/>
-              <a:t>10/27/2014</a:t>
+              <a:t>6/7/2015</a:t>
             </a:fld>
             <a:endParaRPr lang="en-US"/>
           </a:p>
@@ -3363,7 +3363,7 @@
           <a:p>
             <a:fld id="{D51B1278-D92B-4AF3-A9C1-71DD298190CE}" type="datetimeFigureOut">
               <a:rPr lang="en-US" smtClean="0"/>
-              <a:t>10/27/2014</a:t>
+              <a:t>6/7/2015</a:t>
             </a:fld>
             <a:endParaRPr lang="en-US"/>
           </a:p>
@@ -3628,7 +3628,7 @@
           <a:p>
             <a:fld id="{B079C3B8-7366-4A44-A34B-3977080C19E7}" type="datetime1">
               <a:rPr lang="en-US" smtClean="0"/>
-              <a:t>10/27/2014</a:t>
+              <a:t>6/7/2015</a:t>
             </a:fld>
             <a:endParaRPr lang="en-US" dirty="0"/>
           </a:p>
@@ -3776,7 +3776,7 @@
           <a:p>
             <a:fld id="{D51B1278-D92B-4AF3-A9C1-71DD298190CE}" type="datetimeFigureOut">
               <a:rPr lang="en-US" smtClean="0"/>
-              <a:t>10/27/2014</a:t>
+              <a:t>6/7/2015</a:t>
             </a:fld>
             <a:endParaRPr lang="en-US"/>
           </a:p>
@@ -4026,7 +4026,7 @@
           <a:p>
             <a:fld id="{D51B1278-D92B-4AF3-A9C1-71DD298190CE}" type="datetimeFigureOut">
               <a:rPr lang="en-US" smtClean="0"/>
-              <a:t>10/27/2014</a:t>
+              <a:t>6/7/2015</a:t>
             </a:fld>
             <a:endParaRPr lang="en-US"/>
           </a:p>
@@ -4291,7 +4291,7 @@
           <a:p>
             <a:fld id="{B079C3B8-7366-4A44-A34B-3977080C19E7}" type="datetime1">
               <a:rPr lang="en-US" smtClean="0"/>
-              <a:t>10/27/2014</a:t>
+              <a:t>6/7/2015</a:t>
             </a:fld>
             <a:endParaRPr lang="en-US" dirty="0"/>
           </a:p>
@@ -4538,7 +4538,7 @@
           <a:p>
             <a:fld id="{0BB6559B-C68D-49B4-97AE-9BB74C417927}" type="datetime1">
               <a:rPr lang="en-US" smtClean="0"/>
-              <a:t>10/27/2014</a:t>
+              <a:t>6/7/2015</a:t>
             </a:fld>
             <a:endParaRPr lang="en-US"/>
           </a:p>
@@ -4772,7 +4772,7 @@
           <a:p>
             <a:fld id="{3DE98D88-4B2E-4AAB-9ECA-CFD46E198059}" type="datetime1">
               <a:rPr lang="en-US" smtClean="0"/>
-              <a:t>10/27/2014</a:t>
+              <a:t>6/7/2015</a:t>
             </a:fld>
             <a:endParaRPr lang="en-US" dirty="0"/>
           </a:p>
@@ -5098,7 +5098,7 @@
           <a:p>
             <a:fld id="{D51B1278-D92B-4AF3-A9C1-71DD298190CE}" type="datetimeFigureOut">
               <a:rPr lang="en-US" smtClean="0"/>
-              <a:t>10/27/2014</a:t>
+              <a:t>6/7/2015</a:t>
             </a:fld>
             <a:endParaRPr lang="en-US"/>
           </a:p>
@@ -5736,7 +5736,7 @@
                 </a:solidFill>
               </a:rPr>
               <a:pPr/>
-              <a:t>10/27/2014</a:t>
+              <a:t>6/7/2015</a:t>
             </a:fld>
             <a:endParaRPr lang="en-US">
               <a:solidFill>
@@ -5977,7 +5977,7 @@
           <a:p>
             <a:fld id="{3B7A2A12-E0E2-4D2C-A6ED-C38FD9033759}" type="datetime1">
               <a:rPr lang="en-US" smtClean="0"/>
-              <a:t>10/27/2014</a:t>
+              <a:t>6/7/2015</a:t>
             </a:fld>
             <a:endParaRPr lang="en-US" dirty="0"/>
           </a:p>
@@ -16171,9 +16171,14 @@
           <a:lstStyle/>
           <a:p>
             <a:r>
+              <a:rPr lang="en-US" sz="6600" dirty="0" err="1"/>
+              <a:t>DevCamp</a:t>
+            </a:r>
+            <a:r>
               <a:rPr lang="en-US" sz="6600" dirty="0"/>
-              <a:t>Office Camp</a:t>
+              <a:t>: Office</a:t>
             </a:r>
+            <a:endParaRPr lang="en-US" sz="6600" dirty="0"/>
           </a:p>
         </p:txBody>
       </p:sp>
@@ -16194,7 +16199,7 @@
           <a:p>
             <a:r>
               <a:rPr lang="en-US" dirty="0" smtClean="0"/>
-              <a:t>September 2014</a:t>
+              <a:t>June 2015</a:t>
             </a:r>
             <a:endParaRPr lang="en-US" dirty="0"/>
           </a:p>
@@ -17817,7 +17822,7 @@
           </a:effectLst>
           <a:extLst>
             <a:ext uri="{909E8E84-426E-40dd-AFC4-6F175D3DCCD1}">
-              <a14:hiddenFill xmlns="" xmlns:a14="http://schemas.microsoft.com/office/drawing/2010/main">
+              <a14:hiddenFill xmlns:a14="http://schemas.microsoft.com/office/drawing/2010/main" xmlns="">
                 <a:solidFill>
                   <a:srgbClr val="FFFFFF"/>
                 </a:solidFill>
@@ -17920,7 +17925,7 @@
           <a:noFill/>
           <a:extLst>
             <a:ext uri="{909E8E84-426E-40dd-AFC4-6F175D3DCCD1}">
-              <a14:hiddenFill xmlns="" xmlns:a14="http://schemas.microsoft.com/office/drawing/2010/main">
+              <a14:hiddenFill xmlns:a14="http://schemas.microsoft.com/office/drawing/2010/main" xmlns="">
                 <a:solidFill>
                   <a:srgbClr val="FFFFFF"/>
                 </a:solidFill>
@@ -22088,7 +22093,7 @@
           </a:effectLst>
           <a:extLst>
             <a:ext uri="{909E8E84-426E-40dd-AFC4-6F175D3DCCD1}">
-              <a14:hiddenFill xmlns="" xmlns:a14="http://schemas.microsoft.com/office/drawing/2010/main">
+              <a14:hiddenFill xmlns:a14="http://schemas.microsoft.com/office/drawing/2010/main" xmlns="">
                 <a:solidFill>
                   <a:schemeClr val="accent1"/>
                 </a:solidFill>
@@ -24338,7 +24343,7 @@
                 <a:gridCol w="11225057">
                   <a:extLst>
                     <a:ext uri="{9D8B030D-6E8A-4147-A177-3AD203B41FA5}">
-                      <a16:colId xmlns="" xmlns:a16="http://schemas.microsoft.com/office/drawing/2014/main" val="1253488153"/>
+                      <a16:colId xmlns:a16="http://schemas.microsoft.com/office/drawing/2014/main" xmlns="" val="1253488153"/>
                     </a:ext>
                   </a:extLst>
                 </a:gridCol>
@@ -24360,7 +24365,7 @@
                 </a:tc>
                 <a:extLst>
                   <a:ext uri="{0D108BD9-81ED-4DB2-BD59-A6C34878D82A}">
-                    <a16:rowId xmlns="" xmlns:a16="http://schemas.microsoft.com/office/drawing/2014/main" val="829859176"/>
+                    <a16:rowId xmlns:a16="http://schemas.microsoft.com/office/drawing/2014/main" xmlns="" val="829859176"/>
                   </a:ext>
                 </a:extLst>
               </a:tr>
@@ -24380,7 +24385,7 @@
                 </a:tc>
                 <a:extLst>
                   <a:ext uri="{0D108BD9-81ED-4DB2-BD59-A6C34878D82A}">
-                    <a16:rowId xmlns="" xmlns:a16="http://schemas.microsoft.com/office/drawing/2014/main" val="1946132611"/>
+                    <a16:rowId xmlns:a16="http://schemas.microsoft.com/office/drawing/2014/main" xmlns="" val="1946132611"/>
                   </a:ext>
                 </a:extLst>
               </a:tr>
@@ -24417,7 +24422,7 @@
                 </a:tc>
                 <a:extLst>
                   <a:ext uri="{0D108BD9-81ED-4DB2-BD59-A6C34878D82A}">
-                    <a16:rowId xmlns="" xmlns:a16="http://schemas.microsoft.com/office/drawing/2014/main" val="3204002662"/>
+                    <a16:rowId xmlns:a16="http://schemas.microsoft.com/office/drawing/2014/main" xmlns="" val="3204002662"/>
                   </a:ext>
                 </a:extLst>
               </a:tr>
@@ -24454,7 +24459,7 @@
                 </a:tc>
                 <a:extLst>
                   <a:ext uri="{0D108BD9-81ED-4DB2-BD59-A6C34878D82A}">
-                    <a16:rowId xmlns="" xmlns:a16="http://schemas.microsoft.com/office/drawing/2014/main" val="4266278162"/>
+                    <a16:rowId xmlns:a16="http://schemas.microsoft.com/office/drawing/2014/main" xmlns="" val="4266278162"/>
                   </a:ext>
                 </a:extLst>
               </a:tr>
@@ -28216,7 +28221,7 @@
               </a:ln>
               <a:extLst>
                 <a:ext uri="{91240B29-F687-4f45-9708-019B960494DF}">
-                  <a14:hiddenLine xmlns="" xmlns:a14="http://schemas.microsoft.com/office/drawing/2010/main" w="9525">
+                  <a14:hiddenLine xmlns:a14="http://schemas.microsoft.com/office/drawing/2010/main" xmlns="" w="9525">
                     <a:solidFill>
                       <a:srgbClr val="000000"/>
                     </a:solidFill>
@@ -28317,7 +28322,7 @@
               </a:ln>
               <a:extLst>
                 <a:ext uri="{91240B29-F687-4f45-9708-019B960494DF}">
-                  <a14:hiddenLine xmlns="" xmlns:a14="http://schemas.microsoft.com/office/drawing/2010/main" w="9525">
+                  <a14:hiddenLine xmlns:a14="http://schemas.microsoft.com/office/drawing/2010/main" xmlns="" w="9525">
                     <a:solidFill>
                       <a:srgbClr val="000000"/>
                     </a:solidFill>
@@ -35117,7 +35122,7 @@
               </a:ln>
               <a:extLst>
                 <a:ext uri="{91240B29-F687-4f45-9708-019B960494DF}">
-                  <a14:hiddenLine xmlns="" xmlns:a14="http://schemas.microsoft.com/office/drawing/2010/main" w="9525">
+                  <a14:hiddenLine xmlns:a14="http://schemas.microsoft.com/office/drawing/2010/main" xmlns="" w="9525">
                     <a:solidFill>
                       <a:srgbClr val="000000"/>
                     </a:solidFill>
@@ -35275,7 +35280,7 @@
               </a:ln>
               <a:extLst>
                 <a:ext uri="{91240B29-F687-4f45-9708-019B960494DF}">
-                  <a14:hiddenLine xmlns="" xmlns:a14="http://schemas.microsoft.com/office/drawing/2010/main" w="9525">
+                  <a14:hiddenLine xmlns:a14="http://schemas.microsoft.com/office/drawing/2010/main" xmlns="" w="9525">
                     <a:solidFill>
                       <a:srgbClr val="000000"/>
                     </a:solidFill>
@@ -35335,7 +35340,7 @@
               </a:ln>
               <a:extLst>
                 <a:ext uri="{91240B29-F687-4f45-9708-019B960494DF}">
-                  <a14:hiddenLine xmlns="" xmlns:a14="http://schemas.microsoft.com/office/drawing/2010/main" w="9525">
+                  <a14:hiddenLine xmlns:a14="http://schemas.microsoft.com/office/drawing/2010/main" xmlns="" w="9525">
                     <a:solidFill>
                       <a:srgbClr val="000000"/>
                     </a:solidFill>
@@ -35512,7 +35517,7 @@
               </a:ln>
               <a:extLst>
                 <a:ext uri="{91240B29-F687-4f45-9708-019B960494DF}">
-                  <a14:hiddenLine xmlns="" xmlns:a14="http://schemas.microsoft.com/office/drawing/2010/main" w="9525">
+                  <a14:hiddenLine xmlns:a14="http://schemas.microsoft.com/office/drawing/2010/main" xmlns="" w="9525">
                     <a:solidFill>
                       <a:srgbClr val="000000"/>
                     </a:solidFill>
@@ -37050,11 +37055,7 @@
           <a:p>
             <a:r>
               <a:rPr lang="en-US" sz="3100" b="0" dirty="0" smtClean="0"/>
-              <a:t>Module 4 – Hook into Office </a:t>
-            </a:r>
-            <a:r>
-              <a:rPr lang="en-US" sz="3100" b="0" dirty="0" smtClean="0"/>
-              <a:t>365 APIs</a:t>
+              <a:t>Module 4 – Hook into Office 365 APIs</a:t>
             </a:r>
             <a:endParaRPr lang="en-US" sz="3100" b="0" dirty="0"/>
           </a:p>
@@ -37169,20 +37170,77 @@
           <a:bodyPr/>
           <a:lstStyle/>
           <a:p>
+            <a:pPr>
+              <a:spcBef>
+                <a:spcPts val="600"/>
+              </a:spcBef>
+            </a:pPr>
             <a:r>
-              <a:rPr lang="en-US" dirty="0" smtClean="0"/>
-              <a:t>Speaker</a:t>
+              <a:rPr lang="en-US" dirty="0">
+                <a:solidFill>
+                  <a:schemeClr val="bg1"/>
+                </a:solidFill>
+              </a:rPr>
+              <a:t>Ivan Sanders			</a:t>
             </a:r>
           </a:p>
           <a:p>
-            <a:endParaRPr lang="en-US" dirty="0" smtClean="0"/>
-          </a:p>
-          <a:p>
+            <a:pPr>
+              <a:spcBef>
+                <a:spcPts val="600"/>
+              </a:spcBef>
+            </a:pPr>
             <a:r>
-              <a:rPr lang="en-US" dirty="0" smtClean="0"/>
-              <a:t>Speaker</a:t>
+              <a:rPr lang="en-US" dirty="0">
+                <a:solidFill>
+                  <a:schemeClr val="bg1"/>
+                </a:solidFill>
+              </a:rPr>
+              <a:t>SharePoint MVP/MCT		</a:t>
             </a:r>
-            <a:endParaRPr lang="en-US" dirty="0"/>
+          </a:p>
+          <a:p>
+            <a:pPr>
+              <a:spcBef>
+                <a:spcPts val="600"/>
+              </a:spcBef>
+            </a:pPr>
+            <a:r>
+              <a:rPr lang="en-US" dirty="0">
+                <a:solidFill>
+                  <a:schemeClr val="bg1"/>
+                </a:solidFill>
+              </a:rPr>
+              <a:t>ivan@dimension-si.com		</a:t>
+            </a:r>
+          </a:p>
+          <a:p>
+            <a:pPr>
+              <a:spcBef>
+                <a:spcPts val="600"/>
+              </a:spcBef>
+            </a:pPr>
+            <a:r>
+              <a:rPr lang="en-US" dirty="0">
+                <a:solidFill>
+                  <a:schemeClr val="bg1"/>
+                </a:solidFill>
+              </a:rPr>
+              <a:t>@</a:t>
+            </a:r>
+            <a:r>
+              <a:rPr lang="en-US" dirty="0" err="1" smtClean="0">
+                <a:solidFill>
+                  <a:schemeClr val="bg1"/>
+                </a:solidFill>
+              </a:rPr>
+              <a:t>iasanders</a:t>
+            </a:r>
+            <a:endParaRPr lang="en-US" dirty="0">
+              <a:solidFill>
+                <a:schemeClr val="bg1"/>
+              </a:solidFill>
+            </a:endParaRPr>
           </a:p>
         </p:txBody>
       </p:sp>
@@ -38152,7 +38210,6 @@
               <a:rPr lang="en-US" dirty="0" smtClean="0"/>
               <a:t>Understand Office 365 APIs</a:t>
             </a:r>
-            <a:endParaRPr lang="en-US" dirty="0" smtClean="0"/>
           </a:p>
           <a:p>
             <a:endParaRPr lang="en-US" dirty="0"/>
@@ -38160,11 +38217,7 @@
           <a:p>
             <a:r>
               <a:rPr lang="en-US" dirty="0" smtClean="0"/>
-              <a:t>Understand how to create </a:t>
-            </a:r>
-            <a:r>
-              <a:rPr lang="en-US" dirty="0" smtClean="0"/>
-              <a:t>an ASP.NET MVC5 application that uses the Office 365 APIs</a:t>
+              <a:t>Understand how to create an ASP.NET MVC5 application that uses the Office 365 APIs</a:t>
             </a:r>
             <a:endParaRPr lang="en-US" dirty="0"/>
           </a:p>
@@ -39435,12 +39488,6 @@
 </file>
 
 <file path=customXml/item1.xml><?xml version="1.0" encoding="utf-8"?>
-<p:properties xmlns:p="http://schemas.microsoft.com/office/2006/metadata/properties" xmlns:xsi="http://www.w3.org/2001/XMLSchema-instance" xmlns:pc="http://schemas.microsoft.com/office/infopath/2007/PartnerControls">
-  <documentManagement/>
-</p:properties>
-</file>
-
-<file path=customXml/item2.xml><?xml version="1.0" encoding="utf-8"?>
 <ct:contentTypeSchema xmlns:ct="http://schemas.microsoft.com/office/2006/metadata/contentType" xmlns:ma="http://schemas.microsoft.com/office/2006/metadata/properties/metaAttributes" ct:_="" ma:_="" ma:contentTypeName="Document" ma:contentTypeID="0x010100A2E4C90AA7333249A7DBC8CC6F49919B" ma:contentTypeVersion="1" ma:contentTypeDescription="Create a new document." ma:contentTypeScope="" ma:versionID="e7b09f0f38d7ed30c7da14951e97abcc">
   <xsd:schema xmlns:xsd="http://www.w3.org/2001/XMLSchema" xmlns:xs="http://www.w3.org/2001/XMLSchema" xmlns:p="http://schemas.microsoft.com/office/2006/metadata/properties" xmlns:ns2="5fad15d0-477e-40da-a20d-40d4ca777cbd" targetNamespace="http://schemas.microsoft.com/office/2006/metadata/properties" ma:root="true" ma:fieldsID="0cee24db179c30c5ebec40b677cadf70" ns2:_="">
     <xsd:import namespace="5fad15d0-477e-40da-a20d-40d4ca777cbd"/>
@@ -39580,6 +39627,12 @@
 </ct:contentTypeSchema>
 </file>
 
+<file path=customXml/item2.xml><?xml version="1.0" encoding="utf-8"?>
+<p:properties xmlns:p="http://schemas.microsoft.com/office/2006/metadata/properties" xmlns:xsi="http://www.w3.org/2001/XMLSchema-instance" xmlns:pc="http://schemas.microsoft.com/office/infopath/2007/PartnerControls">
+  <documentManagement/>
+</p:properties>
+</file>
+
 <file path=customXml/item3.xml><?xml version="1.0" encoding="utf-8"?>
 <?mso-contentType ?>
 <FormTemplates xmlns="http://schemas.microsoft.com/sharepoint/v3/contenttype/forms">
@@ -39590,22 +39643,6 @@
 </file>
 
 <file path=customXml/itemProps1.xml><?xml version="1.0" encoding="utf-8"?>
-<ds:datastoreItem xmlns:ds="http://schemas.openxmlformats.org/officeDocument/2006/customXml" ds:itemID="{DA593625-DB14-4FB0-B5A9-3269FA9C120B}">
-  <ds:schemaRefs>
-    <ds:schemaRef ds:uri="http://purl.org/dc/elements/1.1/"/>
-    <ds:schemaRef ds:uri="http://schemas.microsoft.com/office/infopath/2007/PartnerControls"/>
-    <ds:schemaRef ds:uri="5fad15d0-477e-40da-a20d-40d4ca777cbd"/>
-    <ds:schemaRef ds:uri="http://purl.org/dc/terms/"/>
-    <ds:schemaRef ds:uri="http://schemas.microsoft.com/office/2006/metadata/properties"/>
-    <ds:schemaRef ds:uri="http://schemas.microsoft.com/office/2006/documentManagement/types"/>
-    <ds:schemaRef ds:uri="http://schemas.openxmlformats.org/package/2006/metadata/core-properties"/>
-    <ds:schemaRef ds:uri="http://purl.org/dc/dcmitype/"/>
-    <ds:schemaRef ds:uri="http://www.w3.org/XML/1998/namespace"/>
-  </ds:schemaRefs>
-</ds:datastoreItem>
-</file>
-
-<file path=customXml/itemProps2.xml><?xml version="1.0" encoding="utf-8"?>
 <ds:datastoreItem xmlns:ds="http://schemas.openxmlformats.org/officeDocument/2006/customXml" ds:itemID="{F17DCE38-6787-497B-B958-75817420EB1E}">
   <ds:schemaRefs>
     <ds:schemaRef ds:uri="http://schemas.microsoft.com/office/2006/metadata/contentType"/>
@@ -39623,6 +39660,22 @@
 </ds:datastoreItem>
 </file>
 
+<file path=customXml/itemProps2.xml><?xml version="1.0" encoding="utf-8"?>
+<ds:datastoreItem xmlns:ds="http://schemas.openxmlformats.org/officeDocument/2006/customXml" ds:itemID="{DA593625-DB14-4FB0-B5A9-3269FA9C120B}">
+  <ds:schemaRefs>
+    <ds:schemaRef ds:uri="http://purl.org/dc/terms/"/>
+    <ds:schemaRef ds:uri="http://schemas.microsoft.com/office/2006/metadata/properties"/>
+    <ds:schemaRef ds:uri="http://schemas.microsoft.com/office/2006/documentManagement/types"/>
+    <ds:schemaRef ds:uri="http://schemas.microsoft.com/office/infopath/2007/PartnerControls"/>
+    <ds:schemaRef ds:uri="http://purl.org/dc/elements/1.1/"/>
+    <ds:schemaRef ds:uri="http://schemas.openxmlformats.org/package/2006/metadata/core-properties"/>
+    <ds:schemaRef ds:uri="5fad15d0-477e-40da-a20d-40d4ca777cbd"/>
+    <ds:schemaRef ds:uri="http://purl.org/dc/dcmitype/"/>
+    <ds:schemaRef ds:uri="http://www.w3.org/XML/1998/namespace"/>
+  </ds:schemaRefs>
+</ds:datastoreItem>
+</file>
+
 <file path=customXml/itemProps3.xml><?xml version="1.0" encoding="utf-8"?>
 <ds:datastoreItem xmlns:ds="http://schemas.openxmlformats.org/officeDocument/2006/customXml" ds:itemID="{E1E0CE18-CA03-4891-9CD8-3448778E3D53}">
   <ds:schemaRefs>

</xml_diff>